<commit_message>
CSS 2.Presentation Lecture, Demo and HW
</commit_message>
<xml_diff>
--- a/5. CSS/Lectures/3. CSS-Presentation.pptx
+++ b/5. CSS/Lectures/3. CSS-Presentation.pptx
@@ -148,7 +148,7 @@
   </p:defaultTextStyle>
   <p:extLst>
     <p:ext uri="{EFAFB233-063F-42B5-8137-9DF3F51BA10A}">
-      <p15:sldGuideLst xmlns:p15="http://schemas.microsoft.com/office/powerpoint/2012/main"/>
+      <p15:sldGuideLst xmlns:p15="http://schemas.microsoft.com/office/powerpoint/2012/main" xmlns=""/>
     </p:ext>
   </p:extLst>
 </p:presentation>
@@ -236,7 +236,7 @@
           <a:p>
             <a:fld id="{1C9C6C66-9DA0-4B17-A625-CB04F094DECA}" type="datetimeFigureOut">
               <a:rPr lang="en-US" smtClean="0"/>
-              <a:t>14-Jan-13</a:t>
+              <a:t>4/2/2014</a:t>
             </a:fld>
             <a:endParaRPr lang="en-US"/>
           </a:p>
@@ -5921,133 +5921,6 @@
       </p:sp>
       <p:sp>
         <p:nvSpPr>
-          <p:cNvPr id="6" name="Text Placeholder 5"/>
-          <p:cNvSpPr>
-            <a:spLocks noGrp="1"/>
-          </p:cNvSpPr>
-          <p:nvPr>
-            <p:ph type="body" sz="quarter" idx="10"/>
-          </p:nvPr>
-        </p:nvSpPr>
-        <p:spPr/>
-        <p:txBody>
-          <a:bodyPr/>
-          <a:lstStyle/>
-          <a:p>
-            <a:r>
-              <a:rPr lang="en-US" dirty="0" smtClean="0"/>
-              <a:t>Doncho Minkov</a:t>
-            </a:r>
-            <a:endParaRPr lang="en-US" dirty="0"/>
-          </a:p>
-        </p:txBody>
-      </p:sp>
-      <p:sp>
-        <p:nvSpPr>
-          <p:cNvPr id="7" name="Text Placeholder 6"/>
-          <p:cNvSpPr>
-            <a:spLocks noGrp="1"/>
-          </p:cNvSpPr>
-          <p:nvPr>
-            <p:ph type="body" sz="quarter" idx="11"/>
-          </p:nvPr>
-        </p:nvSpPr>
-        <p:spPr/>
-        <p:txBody>
-          <a:bodyPr/>
-          <a:lstStyle/>
-          <a:p>
-            <a:r>
-              <a:rPr lang="en-US" dirty="0" smtClean="0"/>
-              <a:t>Telerik Software Academy</a:t>
-            </a:r>
-            <a:endParaRPr lang="en-US" dirty="0"/>
-          </a:p>
-        </p:txBody>
-      </p:sp>
-      <p:sp>
-        <p:nvSpPr>
-          <p:cNvPr id="8" name="Text Placeholder 7"/>
-          <p:cNvSpPr>
-            <a:spLocks noGrp="1"/>
-          </p:cNvSpPr>
-          <p:nvPr>
-            <p:ph type="body" sz="quarter" idx="12"/>
-          </p:nvPr>
-        </p:nvSpPr>
-        <p:spPr/>
-        <p:txBody>
-          <a:bodyPr/>
-          <a:lstStyle/>
-          <a:p>
-            <a:r>
-              <a:rPr lang="en-US" dirty="0" smtClean="0">
-                <a:hlinkClick r:id="rId2"/>
-              </a:rPr>
-              <a:t>http://academy.telerik.com</a:t>
-            </a:r>
-            <a:r>
-              <a:rPr lang="en-US" dirty="0" smtClean="0"/>
-              <a:t> </a:t>
-            </a:r>
-            <a:endParaRPr lang="en-US" dirty="0"/>
-          </a:p>
-        </p:txBody>
-      </p:sp>
-      <p:sp>
-        <p:nvSpPr>
-          <p:cNvPr id="9" name="Text Placeholder 8"/>
-          <p:cNvSpPr>
-            <a:spLocks noGrp="1"/>
-          </p:cNvSpPr>
-          <p:nvPr>
-            <p:ph type="body" sz="quarter" idx="13"/>
-          </p:nvPr>
-        </p:nvSpPr>
-        <p:spPr/>
-        <p:txBody>
-          <a:bodyPr/>
-          <a:lstStyle/>
-          <a:p>
-            <a:r>
-              <a:rPr lang="en-US" dirty="0" smtClean="0"/>
-              <a:t>Technical Trainer</a:t>
-            </a:r>
-            <a:endParaRPr lang="en-US" dirty="0"/>
-          </a:p>
-        </p:txBody>
-      </p:sp>
-      <p:sp>
-        <p:nvSpPr>
-          <p:cNvPr id="10" name="Text Placeholder 9"/>
-          <p:cNvSpPr>
-            <a:spLocks noGrp="1"/>
-          </p:cNvSpPr>
-          <p:nvPr>
-            <p:ph type="body" sz="quarter" idx="14"/>
-          </p:nvPr>
-        </p:nvSpPr>
-        <p:spPr/>
-        <p:txBody>
-          <a:bodyPr/>
-          <a:lstStyle/>
-          <a:p>
-            <a:r>
-              <a:rPr lang="en-US" dirty="0" smtClean="0">
-                <a:hlinkClick r:id="rId3"/>
-              </a:rPr>
-              <a:t>http://minkov.it</a:t>
-            </a:r>
-            <a:r>
-              <a:rPr lang="en-US" dirty="0" smtClean="0"/>
-              <a:t> </a:t>
-            </a:r>
-            <a:endParaRPr lang="en-US" dirty="0"/>
-          </a:p>
-        </p:txBody>
-      </p:sp>
-      <p:sp>
-        <p:nvSpPr>
           <p:cNvPr id="11" name="TextBox 10"/>
           <p:cNvSpPr txBox="1"/>
           <p:nvPr/>
@@ -6209,7 +6082,7 @@
                   </a:innerShdw>
                   <a:reflection blurRad="63500" stA="50000" endPos="50000" dist="12700" dir="5400000" sy="-100000" algn="bl" rotWithShape="0"/>
                 </a:effectLst>
-                <a:hlinkClick r:id="rId4"/>
+                <a:hlinkClick r:id="rId2"/>
               </a:rPr>
               <a:t>http://html5course.telerik.com</a:t>
             </a:r>
@@ -6262,7 +6135,7 @@
           <p:nvPr/>
         </p:nvPicPr>
         <p:blipFill rotWithShape="1">
-          <a:blip r:embed="rId5" cstate="screen">
+          <a:blip r:embed="rId3" cstate="screen">
             <a:extLst>
               <a:ext uri="{28A0092B-C50C-407E-A947-70E740481C1C}">
                 <a14:useLocalDpi xmlns:a14="http://schemas.microsoft.com/office/drawing/2010/main"/>
@@ -6274,7 +6147,7 @@
         </p:blipFill>
         <p:spPr bwMode="auto">
           <a:xfrm>
-            <a:off x="3886200" y="4352544"/>
+            <a:off x="3974976" y="4352544"/>
             <a:ext cx="4898644" cy="2247168"/>
           </a:xfrm>
           <a:prstGeom prst="roundRect">
@@ -6293,6 +6166,70 @@
               </a:schemeClr>
             </a:solidFill>
           </a:ln>
+        </p:spPr>
+      </p:pic>
+      <p:pic>
+        <p:nvPicPr>
+          <p:cNvPr id="16" name="Picture 2"/>
+          <p:cNvPicPr>
+            <a:picLocks noChangeAspect="1" noChangeArrowheads="1"/>
+          </p:cNvPicPr>
+          <p:nvPr/>
+        </p:nvPicPr>
+        <p:blipFill>
+          <a:blip r:embed="rId4">
+            <a:extLst>
+              <a:ext uri="{28A0092B-C50C-407E-A947-70E740481C1C}">
+                <a14:useLocalDpi xmlns:a14="http://schemas.microsoft.com/office/drawing/2010/main" val="0"/>
+              </a:ext>
+            </a:extLst>
+          </a:blip>
+          <a:srcRect/>
+          <a:stretch>
+            <a:fillRect/>
+          </a:stretch>
+        </p:blipFill>
+        <p:spPr bwMode="auto">
+          <a:xfrm>
+            <a:off x="164304" y="5338343"/>
+            <a:ext cx="4090987" cy="1219200"/>
+          </a:xfrm>
+          <a:prstGeom prst="rect">
+            <a:avLst/>
+          </a:prstGeom>
+          <a:noFill/>
+          <a:ln>
+            <a:noFill/>
+          </a:ln>
+          <a:effectLst/>
+          <a:extLst>
+            <a:ext uri="{909E8E84-426E-40DD-AFC4-6F175D3DCCD1}">
+              <a14:hiddenFill xmlns:a14="http://schemas.microsoft.com/office/drawing/2010/main">
+                <a:solidFill>
+                  <a:schemeClr val="accent1"/>
+                </a:solidFill>
+              </a14:hiddenFill>
+            </a:ext>
+            <a:ext uri="{91240B29-F687-4F45-9708-019B960494DF}">
+              <a14:hiddenLine xmlns:a14="http://schemas.microsoft.com/office/drawing/2010/main" w="9525">
+                <a:solidFill>
+                  <a:schemeClr val="tx1"/>
+                </a:solidFill>
+                <a:miter lim="800000"/>
+                <a:headEnd/>
+                <a:tailEnd/>
+              </a14:hiddenLine>
+            </a:ext>
+            <a:ext uri="{AF507438-7753-43E0-B8FC-AC1667EBCBE1}">
+              <a14:hiddenEffects xmlns:a14="http://schemas.microsoft.com/office/drawing/2010/main">
+                <a:effectLst>
+                  <a:outerShdw dist="35921" dir="2700000" algn="ctr" rotWithShape="0">
+                    <a:schemeClr val="bg2"/>
+                  </a:outerShdw>
+                </a:effectLst>
+              </a14:hiddenEffects>
+            </a:ext>
+          </a:extLst>
         </p:spPr>
       </p:pic>
     </p:spTree>
@@ -10328,7 +10265,6 @@
               <a:rPr lang="en-US" dirty="0"/>
               <a:t>Opacity</a:t>
             </a:r>
-            <a:endParaRPr lang="en-US" dirty="0"/>
           </a:p>
         </p:txBody>
       </p:sp>
@@ -19963,7 +19899,7 @@
   <a:extraClrSchemeLst/>
   <a:extLst>
     <a:ext uri="{05A4C25C-085E-4340-85A3-A5531E510DB2}">
-      <thm15:themeFamily xmlns:thm15="http://schemas.microsoft.com/office/thememl/2012/main" name="Office Theme" id="{62F939B6-93AF-4DB8-9C6B-D6C7DFDC589F}" vid="{4A3C46E8-61CC-4603-A589-7422A47A8E4A}"/>
+      <thm15:themeFamily xmlns:thm15="http://schemas.microsoft.com/office/thememl/2012/main" xmlns="" name="Office Theme" id="{62F939B6-93AF-4DB8-9C6B-D6C7DFDC589F}" vid="{4A3C46E8-61CC-4603-A589-7422A47A8E4A}"/>
     </a:ext>
   </a:extLst>
 </a:theme>

</xml_diff>

<commit_message>
CSS hw2 task 1,2
</commit_message>
<xml_diff>
--- a/5. CSS/Lectures/3. CSS-Presentation.pptx
+++ b/5. CSS/Lectures/3. CSS-Presentation.pptx
@@ -148,7 +148,18 @@
   </p:defaultTextStyle>
   <p:extLst>
     <p:ext uri="{EFAFB233-063F-42B5-8137-9DF3F51BA10A}">
-      <p15:sldGuideLst xmlns:p15="http://schemas.microsoft.com/office/powerpoint/2012/main" xmlns=""/>
+      <p15:sldGuideLst xmlns:p15="http://schemas.microsoft.com/office/powerpoint/2012/main">
+        <p15:guide id="1" orient="horz" pos="2160">
+          <p15:clr>
+            <a:srgbClr val="A4A3A4"/>
+          </p15:clr>
+        </p15:guide>
+        <p15:guide id="2" pos="2880">
+          <p15:clr>
+            <a:srgbClr val="A4A3A4"/>
+          </p15:clr>
+        </p15:guide>
+      </p15:sldGuideLst>
     </p:ext>
   </p:extLst>
 </p:presentation>
@@ -236,7 +247,7 @@
           <a:p>
             <a:fld id="{1C9C6C66-9DA0-4B17-A625-CB04F094DECA}" type="datetimeFigureOut">
               <a:rPr lang="en-US" smtClean="0"/>
-              <a:t>4/2/2014</a:t>
+              <a:t>4/7/2014</a:t>
             </a:fld>
             <a:endParaRPr lang="en-US"/>
           </a:p>
@@ -19899,7 +19910,7 @@
   <a:extraClrSchemeLst/>
   <a:extLst>
     <a:ext uri="{05A4C25C-085E-4340-85A3-A5531E510DB2}">
-      <thm15:themeFamily xmlns:thm15="http://schemas.microsoft.com/office/thememl/2012/main" xmlns="" name="Office Theme" id="{62F939B6-93AF-4DB8-9C6B-D6C7DFDC589F}" vid="{4A3C46E8-61CC-4603-A589-7422A47A8E4A}"/>
+      <thm15:themeFamily xmlns:thm15="http://schemas.microsoft.com/office/thememl/2012/main" name="Office Theme" id="{62F939B6-93AF-4DB8-9C6B-D6C7DFDC589F}" vid="{4A3C46E8-61CC-4603-A589-7422A47A8E4A}"/>
     </a:ext>
   </a:extLst>
 </a:theme>

</xml_diff>